<commit_message>
Added course code for csv file handling and new warmup excercises
</commit_message>
<xml_diff>
--- a/002_Course_Exercises/01_Warmup_Exercises/01_CS110_Warmup_Exercises.pptx
+++ b/002_Course_Exercises/01_Warmup_Exercises/01_CS110_Warmup_Exercises.pptx
@@ -5,7 +5,7 @@
     <p:sldMasterId id="2147483681" r:id="rId1"/>
   </p:sldMasterIdLst>
   <p:notesMasterIdLst>
-    <p:notesMasterId r:id="rId11"/>
+    <p:notesMasterId r:id="rId13"/>
   </p:notesMasterIdLst>
   <p:sldIdLst>
     <p:sldId id="343" r:id="rId2"/>
@@ -17,30 +17,32 @@
     <p:sldId id="340" r:id="rId8"/>
     <p:sldId id="341" r:id="rId9"/>
     <p:sldId id="342" r:id="rId10"/>
+    <p:sldId id="344" r:id="rId11"/>
+    <p:sldId id="345" r:id="rId12"/>
   </p:sldIdLst>
   <p:sldSz cx="9144000" cy="5143500" type="screen16x9"/>
   <p:notesSz cx="6858000" cy="9144000"/>
   <p:embeddedFontLst>
     <p:embeddedFont>
       <p:font typeface="Anton" pitchFamily="2" charset="0"/>
-      <p:regular r:id="rId12"/>
+      <p:regular r:id="rId14"/>
     </p:embeddedFont>
     <p:embeddedFont>
       <p:font typeface="Catamaran" panose="020B0604020202020204" charset="0"/>
-      <p:regular r:id="rId13"/>
-      <p:bold r:id="rId14"/>
+      <p:regular r:id="rId15"/>
+      <p:bold r:id="rId16"/>
     </p:embeddedFont>
     <p:embeddedFont>
       <p:font typeface="Consolas" panose="020B0609020204030204" pitchFamily="49" charset="0"/>
-      <p:regular r:id="rId15"/>
-      <p:bold r:id="rId16"/>
-      <p:italic r:id="rId17"/>
-      <p:boldItalic r:id="rId18"/>
+      <p:regular r:id="rId17"/>
+      <p:bold r:id="rId18"/>
+      <p:italic r:id="rId19"/>
+      <p:boldItalic r:id="rId20"/>
     </p:embeddedFont>
     <p:embeddedFont>
       <p:font typeface="Nunito Light" pitchFamily="2" charset="0"/>
-      <p:regular r:id="rId19"/>
-      <p:italic r:id="rId20"/>
+      <p:regular r:id="rId21"/>
+      <p:italic r:id="rId22"/>
     </p:embeddedFont>
   </p:embeddedFontLst>
   <p:defaultTextStyle>
@@ -848,6 +850,133 @@
 </p:notes>
 </file>
 
+<file path=ppt/notesSlides/notesSlide10.xml><?xml version="1.0" encoding="utf-8"?>
+<p:notes xmlns:a="http://schemas.openxmlformats.org/drawingml/2006/main" xmlns:r="http://schemas.openxmlformats.org/officeDocument/2006/relationships" xmlns:p="http://schemas.openxmlformats.org/presentationml/2006/main" showMasterSp="0" showMasterPhAnim="0">
+  <p:cSld>
+    <p:spTree>
+      <p:nvGrpSpPr>
+        <p:cNvPr id="1" name="Shape 873">
+          <a:extLst>
+            <a:ext uri="{FF2B5EF4-FFF2-40B4-BE49-F238E27FC236}">
+              <a16:creationId xmlns:a16="http://schemas.microsoft.com/office/drawing/2014/main" id="{208ADCB1-5531-918B-3D85-47B78F1A8E9D}"/>
+            </a:ext>
+          </a:extLst>
+        </p:cNvPr>
+        <p:cNvGrpSpPr/>
+        <p:nvPr/>
+      </p:nvGrpSpPr>
+      <p:grpSpPr>
+        <a:xfrm>
+          <a:off x="0" y="0"/>
+          <a:ext cx="0" cy="0"/>
+          <a:chOff x="0" y="0"/>
+          <a:chExt cx="0" cy="0"/>
+        </a:xfrm>
+      </p:grpSpPr>
+      <p:sp>
+        <p:nvSpPr>
+          <p:cNvPr id="874" name="Google Shape;874;g1de1b5658bb_0_38:notes">
+            <a:extLst>
+              <a:ext uri="{FF2B5EF4-FFF2-40B4-BE49-F238E27FC236}">
+                <a16:creationId xmlns:a16="http://schemas.microsoft.com/office/drawing/2014/main" id="{5C4B7706-D1EB-350B-9B5C-D9F7653AFF7A}"/>
+              </a:ext>
+            </a:extLst>
+          </p:cNvPr>
+          <p:cNvSpPr>
+            <a:spLocks noGrp="1" noRot="1" noChangeAspect="1"/>
+          </p:cNvSpPr>
+          <p:nvPr>
+            <p:ph type="sldImg" idx="2"/>
+          </p:nvPr>
+        </p:nvSpPr>
+        <p:spPr>
+          <a:xfrm>
+            <a:off x="381000" y="685800"/>
+            <a:ext cx="6096000" cy="3429000"/>
+          </a:xfrm>
+          <a:custGeom>
+            <a:avLst/>
+            <a:gdLst/>
+            <a:ahLst/>
+            <a:cxnLst/>
+            <a:rect l="l" t="t" r="r" b="b"/>
+            <a:pathLst>
+              <a:path w="120000" h="120000" extrusionOk="0">
+                <a:moveTo>
+                  <a:pt x="0" y="0"/>
+                </a:moveTo>
+                <a:lnTo>
+                  <a:pt x="120000" y="0"/>
+                </a:lnTo>
+                <a:lnTo>
+                  <a:pt x="120000" y="120000"/>
+                </a:lnTo>
+                <a:lnTo>
+                  <a:pt x="0" y="120000"/>
+                </a:lnTo>
+                <a:close/>
+              </a:path>
+            </a:pathLst>
+          </a:custGeom>
+        </p:spPr>
+      </p:sp>
+      <p:sp>
+        <p:nvSpPr>
+          <p:cNvPr id="875" name="Google Shape;875;g1de1b5658bb_0_38:notes">
+            <a:extLst>
+              <a:ext uri="{FF2B5EF4-FFF2-40B4-BE49-F238E27FC236}">
+                <a16:creationId xmlns:a16="http://schemas.microsoft.com/office/drawing/2014/main" id="{D535456E-DAA8-90C1-EB14-68B4D6718FEF}"/>
+              </a:ext>
+            </a:extLst>
+          </p:cNvPr>
+          <p:cNvSpPr txBox="1">
+            <a:spLocks noGrp="1"/>
+          </p:cNvSpPr>
+          <p:nvPr>
+            <p:ph type="body" idx="1"/>
+          </p:nvPr>
+        </p:nvSpPr>
+        <p:spPr>
+          <a:xfrm>
+            <a:off x="685800" y="4343400"/>
+            <a:ext cx="5486400" cy="4114800"/>
+          </a:xfrm>
+          <a:prstGeom prst="rect">
+            <a:avLst/>
+          </a:prstGeom>
+        </p:spPr>
+        <p:txBody>
+          <a:bodyPr spcFirstLastPara="1" wrap="square" lIns="91425" tIns="91425" rIns="91425" bIns="91425" anchor="t" anchorCtr="0">
+            <a:noAutofit/>
+          </a:bodyPr>
+          <a:lstStyle/>
+          <a:p>
+            <a:pPr marL="0" lvl="0" indent="0" algn="l" rtl="0">
+              <a:spcBef>
+                <a:spcPts val="0"/>
+              </a:spcBef>
+              <a:spcAft>
+                <a:spcPts val="0"/>
+              </a:spcAft>
+              <a:buNone/>
+            </a:pPr>
+            <a:endParaRPr dirty="0"/>
+          </a:p>
+        </p:txBody>
+      </p:sp>
+    </p:spTree>
+    <p:extLst>
+      <p:ext uri="{BB962C8B-B14F-4D97-AF65-F5344CB8AC3E}">
+        <p14:creationId xmlns:p14="http://schemas.microsoft.com/office/powerpoint/2010/main" val="3977941587"/>
+      </p:ext>
+    </p:extLst>
+  </p:cSld>
+  <p:clrMapOvr>
+    <a:masterClrMapping/>
+  </p:clrMapOvr>
+</p:notes>
+</file>
+
 <file path=ppt/notesSlides/notesSlide2.xml><?xml version="1.0" encoding="utf-8"?>
 <p:notes xmlns:a="http://schemas.openxmlformats.org/drawingml/2006/main" xmlns:r="http://schemas.openxmlformats.org/officeDocument/2006/relationships" xmlns:p="http://schemas.openxmlformats.org/presentationml/2006/main" showMasterSp="0" showMasterPhAnim="0">
   <p:cSld>
@@ -1728,6 +1857,133 @@
     <p:extLst>
       <p:ext uri="{BB962C8B-B14F-4D97-AF65-F5344CB8AC3E}">
         <p14:creationId xmlns:p14="http://schemas.microsoft.com/office/powerpoint/2010/main" val="306392628"/>
+      </p:ext>
+    </p:extLst>
+  </p:cSld>
+  <p:clrMapOvr>
+    <a:masterClrMapping/>
+  </p:clrMapOvr>
+</p:notes>
+</file>
+
+<file path=ppt/notesSlides/notesSlide9.xml><?xml version="1.0" encoding="utf-8"?>
+<p:notes xmlns:a="http://schemas.openxmlformats.org/drawingml/2006/main" xmlns:r="http://schemas.openxmlformats.org/officeDocument/2006/relationships" xmlns:p="http://schemas.openxmlformats.org/presentationml/2006/main" showMasterSp="0" showMasterPhAnim="0">
+  <p:cSld>
+    <p:spTree>
+      <p:nvGrpSpPr>
+        <p:cNvPr id="1" name="Shape 873">
+          <a:extLst>
+            <a:ext uri="{FF2B5EF4-FFF2-40B4-BE49-F238E27FC236}">
+              <a16:creationId xmlns:a16="http://schemas.microsoft.com/office/drawing/2014/main" id="{208ADCB1-5531-918B-3D85-47B78F1A8E9D}"/>
+            </a:ext>
+          </a:extLst>
+        </p:cNvPr>
+        <p:cNvGrpSpPr/>
+        <p:nvPr/>
+      </p:nvGrpSpPr>
+      <p:grpSpPr>
+        <a:xfrm>
+          <a:off x="0" y="0"/>
+          <a:ext cx="0" cy="0"/>
+          <a:chOff x="0" y="0"/>
+          <a:chExt cx="0" cy="0"/>
+        </a:xfrm>
+      </p:grpSpPr>
+      <p:sp>
+        <p:nvSpPr>
+          <p:cNvPr id="874" name="Google Shape;874;g1de1b5658bb_0_38:notes">
+            <a:extLst>
+              <a:ext uri="{FF2B5EF4-FFF2-40B4-BE49-F238E27FC236}">
+                <a16:creationId xmlns:a16="http://schemas.microsoft.com/office/drawing/2014/main" id="{5C4B7706-D1EB-350B-9B5C-D9F7653AFF7A}"/>
+              </a:ext>
+            </a:extLst>
+          </p:cNvPr>
+          <p:cNvSpPr>
+            <a:spLocks noGrp="1" noRot="1" noChangeAspect="1"/>
+          </p:cNvSpPr>
+          <p:nvPr>
+            <p:ph type="sldImg" idx="2"/>
+          </p:nvPr>
+        </p:nvSpPr>
+        <p:spPr>
+          <a:xfrm>
+            <a:off x="381000" y="685800"/>
+            <a:ext cx="6096000" cy="3429000"/>
+          </a:xfrm>
+          <a:custGeom>
+            <a:avLst/>
+            <a:gdLst/>
+            <a:ahLst/>
+            <a:cxnLst/>
+            <a:rect l="l" t="t" r="r" b="b"/>
+            <a:pathLst>
+              <a:path w="120000" h="120000" extrusionOk="0">
+                <a:moveTo>
+                  <a:pt x="0" y="0"/>
+                </a:moveTo>
+                <a:lnTo>
+                  <a:pt x="120000" y="0"/>
+                </a:lnTo>
+                <a:lnTo>
+                  <a:pt x="120000" y="120000"/>
+                </a:lnTo>
+                <a:lnTo>
+                  <a:pt x="0" y="120000"/>
+                </a:lnTo>
+                <a:close/>
+              </a:path>
+            </a:pathLst>
+          </a:custGeom>
+        </p:spPr>
+      </p:sp>
+      <p:sp>
+        <p:nvSpPr>
+          <p:cNvPr id="875" name="Google Shape;875;g1de1b5658bb_0_38:notes">
+            <a:extLst>
+              <a:ext uri="{FF2B5EF4-FFF2-40B4-BE49-F238E27FC236}">
+                <a16:creationId xmlns:a16="http://schemas.microsoft.com/office/drawing/2014/main" id="{D535456E-DAA8-90C1-EB14-68B4D6718FEF}"/>
+              </a:ext>
+            </a:extLst>
+          </p:cNvPr>
+          <p:cNvSpPr txBox="1">
+            <a:spLocks noGrp="1"/>
+          </p:cNvSpPr>
+          <p:nvPr>
+            <p:ph type="body" idx="1"/>
+          </p:nvPr>
+        </p:nvSpPr>
+        <p:spPr>
+          <a:xfrm>
+            <a:off x="685800" y="4343400"/>
+            <a:ext cx="5486400" cy="4114800"/>
+          </a:xfrm>
+          <a:prstGeom prst="rect">
+            <a:avLst/>
+          </a:prstGeom>
+        </p:spPr>
+        <p:txBody>
+          <a:bodyPr spcFirstLastPara="1" wrap="square" lIns="91425" tIns="91425" rIns="91425" bIns="91425" anchor="t" anchorCtr="0">
+            <a:noAutofit/>
+          </a:bodyPr>
+          <a:lstStyle/>
+          <a:p>
+            <a:pPr marL="0" lvl="0" indent="0" algn="l" rtl="0">
+              <a:spcBef>
+                <a:spcPts val="0"/>
+              </a:spcBef>
+              <a:spcAft>
+                <a:spcPts val="0"/>
+              </a:spcAft>
+              <a:buNone/>
+            </a:pPr>
+            <a:endParaRPr dirty="0"/>
+          </a:p>
+        </p:txBody>
+      </p:sp>
+    </p:spTree>
+    <p:extLst>
+      <p:ext uri="{BB962C8B-B14F-4D97-AF65-F5344CB8AC3E}">
+        <p14:creationId xmlns:p14="http://schemas.microsoft.com/office/powerpoint/2010/main" val="525257039"/>
       </p:ext>
     </p:extLst>
   </p:cSld>
@@ -4033,6 +4289,538 @@
 </p:sld>
 </file>
 
+<file path=ppt/slides/slide10.xml><?xml version="1.0" encoding="utf-8"?>
+<p:sld xmlns:a="http://schemas.openxmlformats.org/drawingml/2006/main" xmlns:r="http://schemas.openxmlformats.org/officeDocument/2006/relationships" xmlns:p="http://schemas.openxmlformats.org/presentationml/2006/main">
+  <p:cSld>
+    <p:spTree>
+      <p:nvGrpSpPr>
+        <p:cNvPr id="1" name="Shape 876">
+          <a:extLst>
+            <a:ext uri="{FF2B5EF4-FFF2-40B4-BE49-F238E27FC236}">
+              <a16:creationId xmlns:a16="http://schemas.microsoft.com/office/drawing/2014/main" id="{59AA2DF2-86B2-E92B-1B14-DF2774F31DA9}"/>
+            </a:ext>
+          </a:extLst>
+        </p:cNvPr>
+        <p:cNvGrpSpPr/>
+        <p:nvPr/>
+      </p:nvGrpSpPr>
+      <p:grpSpPr>
+        <a:xfrm>
+          <a:off x="0" y="0"/>
+          <a:ext cx="0" cy="0"/>
+          <a:chOff x="0" y="0"/>
+          <a:chExt cx="0" cy="0"/>
+        </a:xfrm>
+      </p:grpSpPr>
+      <p:sp>
+        <p:nvSpPr>
+          <p:cNvPr id="877" name="Google Shape;877;p41">
+            <a:extLst>
+              <a:ext uri="{FF2B5EF4-FFF2-40B4-BE49-F238E27FC236}">
+                <a16:creationId xmlns:a16="http://schemas.microsoft.com/office/drawing/2014/main" id="{0BE75D26-21D0-F37D-CBE4-5E519EA261C2}"/>
+              </a:ext>
+            </a:extLst>
+          </p:cNvPr>
+          <p:cNvSpPr txBox="1">
+            <a:spLocks noGrp="1"/>
+          </p:cNvSpPr>
+          <p:nvPr>
+            <p:ph type="title"/>
+          </p:nvPr>
+        </p:nvSpPr>
+        <p:spPr>
+          <a:xfrm>
+            <a:off x="281335" y="383241"/>
+            <a:ext cx="7704000" cy="572700"/>
+          </a:xfrm>
+          <a:prstGeom prst="rect">
+            <a:avLst/>
+          </a:prstGeom>
+        </p:spPr>
+        <p:txBody>
+          <a:bodyPr spcFirstLastPara="1" wrap="square" lIns="91425" tIns="91425" rIns="91425" bIns="91425" anchor="t" anchorCtr="0">
+            <a:noAutofit/>
+          </a:bodyPr>
+          <a:lstStyle/>
+          <a:p>
+            <a:pPr marL="0" lvl="0" indent="0" rtl="0">
+              <a:spcBef>
+                <a:spcPts val="0"/>
+              </a:spcBef>
+              <a:spcAft>
+                <a:spcPts val="0"/>
+              </a:spcAft>
+              <a:buNone/>
+            </a:pPr>
+            <a:r>
+              <a:rPr lang="en-CA" sz="3200" dirty="0">
+                <a:solidFill>
+                  <a:schemeClr val="hlink"/>
+                </a:solidFill>
+                <a:uFill>
+                  <a:noFill/>
+                </a:uFill>
+                <a:latin typeface="Anton"/>
+                <a:ea typeface="Anton"/>
+                <a:cs typeface="Anton"/>
+                <a:sym typeface="Anton"/>
+              </a:rPr>
+              <a:t>#9 Coding Warm-Up: Working With Images</a:t>
+            </a:r>
+            <a:endParaRPr lang="en-CA" sz="3200" dirty="0">
+              <a:solidFill>
+                <a:schemeClr val="dk1"/>
+              </a:solidFill>
+              <a:latin typeface="Anton"/>
+              <a:ea typeface="Anton"/>
+              <a:cs typeface="Anton"/>
+              <a:sym typeface="Anton"/>
+            </a:endParaRPr>
+          </a:p>
+        </p:txBody>
+      </p:sp>
+      <p:sp>
+        <p:nvSpPr>
+          <p:cNvPr id="4" name="TextBox 3">
+            <a:extLst>
+              <a:ext uri="{FF2B5EF4-FFF2-40B4-BE49-F238E27FC236}">
+                <a16:creationId xmlns:a16="http://schemas.microsoft.com/office/drawing/2014/main" id="{32A1448D-8968-AB9C-0965-EAE0EA4C9555}"/>
+              </a:ext>
+            </a:extLst>
+          </p:cNvPr>
+          <p:cNvSpPr txBox="1"/>
+          <p:nvPr/>
+        </p:nvSpPr>
+        <p:spPr>
+          <a:xfrm>
+            <a:off x="281334" y="1101336"/>
+            <a:ext cx="8459254" cy="2246769"/>
+          </a:xfrm>
+          <a:prstGeom prst="rect">
+            <a:avLst/>
+          </a:prstGeom>
+          <a:noFill/>
+        </p:spPr>
+        <p:txBody>
+          <a:bodyPr wrap="square">
+            <a:spAutoFit/>
+          </a:bodyPr>
+          <a:lstStyle/>
+          <a:p>
+            <a:r>
+              <a:rPr lang="en-US" b="0" dirty="0">
+                <a:solidFill>
+                  <a:srgbClr val="6A9955"/>
+                </a:solidFill>
+                <a:effectLst/>
+                <a:latin typeface="Consolas" panose="020B0609020204030204" pitchFamily="49" charset="0"/>
+              </a:rPr>
+              <a:t>#Q:Write a python program that copies a text file named “input.txt” with a list of ten items and saves it as “output.txt” with list in reverse order</a:t>
+            </a:r>
+          </a:p>
+          <a:p>
+            <a:endParaRPr lang="en-US" dirty="0">
+              <a:solidFill>
+                <a:srgbClr val="6A9955"/>
+              </a:solidFill>
+              <a:latin typeface="Consolas" panose="020B0609020204030204" pitchFamily="49" charset="0"/>
+            </a:endParaRPr>
+          </a:p>
+          <a:p>
+            <a:r>
+              <a:rPr lang="en-US" b="0" dirty="0">
+                <a:solidFill>
+                  <a:srgbClr val="6A9955"/>
+                </a:solidFill>
+                <a:effectLst/>
+                <a:latin typeface="Consolas" panose="020B0609020204030204" pitchFamily="49" charset="0"/>
+              </a:rPr>
+              <a:t>Hint1: Remember to read in chunks of the OG files by defining a buffer size in bytes</a:t>
+            </a:r>
+          </a:p>
+          <a:p>
+            <a:r>
+              <a:rPr lang="en-US" dirty="0">
+                <a:solidFill>
+                  <a:srgbClr val="6A9955"/>
+                </a:solidFill>
+                <a:latin typeface="Consolas" panose="020B0609020204030204" pitchFamily="49" charset="0"/>
+              </a:rPr>
+              <a:t>       100 would be good, loop through reading the file until there a no more bytes      </a:t>
+            </a:r>
+          </a:p>
+          <a:p>
+            <a:r>
+              <a:rPr lang="en-US" dirty="0">
+                <a:solidFill>
+                  <a:srgbClr val="6A9955"/>
+                </a:solidFill>
+                <a:latin typeface="Consolas" panose="020B0609020204030204" pitchFamily="49" charset="0"/>
+              </a:rPr>
+              <a:t>       to read</a:t>
+            </a:r>
+            <a:endParaRPr lang="en-US" b="0" dirty="0">
+              <a:solidFill>
+                <a:srgbClr val="6A9955"/>
+              </a:solidFill>
+              <a:effectLst/>
+              <a:latin typeface="Consolas" panose="020B0609020204030204" pitchFamily="49" charset="0"/>
+            </a:endParaRPr>
+          </a:p>
+          <a:p>
+            <a:endParaRPr lang="en-US" b="0" dirty="0">
+              <a:solidFill>
+                <a:srgbClr val="6A9955"/>
+              </a:solidFill>
+              <a:effectLst/>
+              <a:latin typeface="Consolas" panose="020B0609020204030204" pitchFamily="49" charset="0"/>
+            </a:endParaRPr>
+          </a:p>
+          <a:p>
+            <a:r>
+              <a:rPr lang="en-US" dirty="0">
+                <a:solidFill>
+                  <a:srgbClr val="6A9955"/>
+                </a:solidFill>
+                <a:latin typeface="Consolas" panose="020B0609020204030204" pitchFamily="49" charset="0"/>
+              </a:rPr>
+              <a:t>Hint2: Remember to read and write the file in “</a:t>
+            </a:r>
+            <a:r>
+              <a:rPr lang="en-US" dirty="0" err="1">
+                <a:solidFill>
+                  <a:srgbClr val="6A9955"/>
+                </a:solidFill>
+                <a:latin typeface="Consolas" panose="020B0609020204030204" pitchFamily="49" charset="0"/>
+              </a:rPr>
+              <a:t>rb</a:t>
+            </a:r>
+            <a:r>
+              <a:rPr lang="en-US" dirty="0">
+                <a:solidFill>
+                  <a:srgbClr val="6A9955"/>
+                </a:solidFill>
+                <a:latin typeface="Consolas" panose="020B0609020204030204" pitchFamily="49" charset="0"/>
+              </a:rPr>
+              <a:t>” and “</a:t>
+            </a:r>
+            <a:r>
+              <a:rPr lang="en-US" dirty="0" err="1">
+                <a:solidFill>
+                  <a:srgbClr val="6A9955"/>
+                </a:solidFill>
+                <a:latin typeface="Consolas" panose="020B0609020204030204" pitchFamily="49" charset="0"/>
+              </a:rPr>
+              <a:t>wb</a:t>
+            </a:r>
+            <a:r>
+              <a:rPr lang="en-US" dirty="0">
+                <a:solidFill>
+                  <a:srgbClr val="6A9955"/>
+                </a:solidFill>
+                <a:latin typeface="Consolas" panose="020B0609020204030204" pitchFamily="49" charset="0"/>
+              </a:rPr>
+              <a:t>” byte mode respectively </a:t>
+            </a:r>
+          </a:p>
+          <a:p>
+            <a:endParaRPr lang="en-US" b="0" dirty="0">
+              <a:solidFill>
+                <a:srgbClr val="6A9955"/>
+              </a:solidFill>
+              <a:effectLst/>
+              <a:latin typeface="Consolas" panose="020B0609020204030204" pitchFamily="49" charset="0"/>
+            </a:endParaRPr>
+          </a:p>
+          <a:p>
+            <a:r>
+              <a:rPr lang="en-US" b="0" dirty="0">
+                <a:solidFill>
+                  <a:srgbClr val="6A9955"/>
+                </a:solidFill>
+                <a:effectLst/>
+                <a:latin typeface="Consolas" panose="020B0609020204030204" pitchFamily="49" charset="0"/>
+              </a:rPr>
+              <a:t>Hint3: split(“\n”)  but the is also </a:t>
+            </a:r>
+            <a:r>
+              <a:rPr lang="en-US" b="0" dirty="0" err="1">
+                <a:solidFill>
+                  <a:srgbClr val="6A9955"/>
+                </a:solidFill>
+                <a:effectLst/>
+                <a:latin typeface="Consolas" panose="020B0609020204030204" pitchFamily="49" charset="0"/>
+              </a:rPr>
+              <a:t>rsplit</a:t>
+            </a:r>
+            <a:r>
+              <a:rPr lang="en-US" b="0" dirty="0">
+                <a:solidFill>
+                  <a:srgbClr val="6A9955"/>
+                </a:solidFill>
+                <a:effectLst/>
+                <a:latin typeface="Consolas" panose="020B0609020204030204" pitchFamily="49" charset="0"/>
+              </a:rPr>
+              <a:t>(“\n”)</a:t>
+            </a:r>
+          </a:p>
+        </p:txBody>
+      </p:sp>
+    </p:spTree>
+    <p:extLst>
+      <p:ext uri="{BB962C8B-B14F-4D97-AF65-F5344CB8AC3E}">
+        <p14:creationId xmlns:p14="http://schemas.microsoft.com/office/powerpoint/2010/main" val="3407961621"/>
+      </p:ext>
+    </p:extLst>
+  </p:cSld>
+  <p:clrMapOvr>
+    <a:masterClrMapping/>
+  </p:clrMapOvr>
+</p:sld>
+</file>
+
+<file path=ppt/slides/slide11.xml><?xml version="1.0" encoding="utf-8"?>
+<p:sld xmlns:a="http://schemas.openxmlformats.org/drawingml/2006/main" xmlns:r="http://schemas.openxmlformats.org/officeDocument/2006/relationships" xmlns:p="http://schemas.openxmlformats.org/presentationml/2006/main">
+  <p:cSld>
+    <p:spTree>
+      <p:nvGrpSpPr>
+        <p:cNvPr id="1" name="Shape 876">
+          <a:extLst>
+            <a:ext uri="{FF2B5EF4-FFF2-40B4-BE49-F238E27FC236}">
+              <a16:creationId xmlns:a16="http://schemas.microsoft.com/office/drawing/2014/main" id="{59AA2DF2-86B2-E92B-1B14-DF2774F31DA9}"/>
+            </a:ext>
+          </a:extLst>
+        </p:cNvPr>
+        <p:cNvGrpSpPr/>
+        <p:nvPr/>
+      </p:nvGrpSpPr>
+      <p:grpSpPr>
+        <a:xfrm>
+          <a:off x="0" y="0"/>
+          <a:ext cx="0" cy="0"/>
+          <a:chOff x="0" y="0"/>
+          <a:chExt cx="0" cy="0"/>
+        </a:xfrm>
+      </p:grpSpPr>
+      <p:sp>
+        <p:nvSpPr>
+          <p:cNvPr id="877" name="Google Shape;877;p41">
+            <a:extLst>
+              <a:ext uri="{FF2B5EF4-FFF2-40B4-BE49-F238E27FC236}">
+                <a16:creationId xmlns:a16="http://schemas.microsoft.com/office/drawing/2014/main" id="{0BE75D26-21D0-F37D-CBE4-5E519EA261C2}"/>
+              </a:ext>
+            </a:extLst>
+          </p:cNvPr>
+          <p:cNvSpPr txBox="1">
+            <a:spLocks noGrp="1"/>
+          </p:cNvSpPr>
+          <p:nvPr>
+            <p:ph type="title"/>
+          </p:nvPr>
+        </p:nvSpPr>
+        <p:spPr>
+          <a:xfrm>
+            <a:off x="281335" y="383241"/>
+            <a:ext cx="7704000" cy="572700"/>
+          </a:xfrm>
+          <a:prstGeom prst="rect">
+            <a:avLst/>
+          </a:prstGeom>
+        </p:spPr>
+        <p:txBody>
+          <a:bodyPr spcFirstLastPara="1" wrap="square" lIns="91425" tIns="91425" rIns="91425" bIns="91425" anchor="t" anchorCtr="0">
+            <a:noAutofit/>
+          </a:bodyPr>
+          <a:lstStyle/>
+          <a:p>
+            <a:pPr marL="0" lvl="0" indent="0" rtl="0">
+              <a:spcBef>
+                <a:spcPts val="0"/>
+              </a:spcBef>
+              <a:spcAft>
+                <a:spcPts val="0"/>
+              </a:spcAft>
+              <a:buNone/>
+            </a:pPr>
+            <a:r>
+              <a:rPr lang="en-CA" sz="3200" dirty="0">
+                <a:solidFill>
+                  <a:schemeClr val="hlink"/>
+                </a:solidFill>
+                <a:uFill>
+                  <a:noFill/>
+                </a:uFill>
+                <a:latin typeface="Anton"/>
+                <a:ea typeface="Anton"/>
+                <a:cs typeface="Anton"/>
+                <a:sym typeface="Anton"/>
+              </a:rPr>
+              <a:t>#10 Coding Warm-Up: Working </a:t>
+            </a:r>
+            <a:r>
+              <a:rPr lang="en-CA" sz="3200" dirty="0">
+                <a:solidFill>
+                  <a:schemeClr val="hlink"/>
+                </a:solidFill>
+                <a:uFill>
+                  <a:noFill/>
+                </a:uFill>
+              </a:rPr>
+              <a:t>CSV Data Files</a:t>
+            </a:r>
+            <a:endParaRPr lang="en-CA" sz="3200" dirty="0">
+              <a:solidFill>
+                <a:schemeClr val="dk1"/>
+              </a:solidFill>
+              <a:latin typeface="Anton"/>
+              <a:ea typeface="Anton"/>
+              <a:cs typeface="Anton"/>
+              <a:sym typeface="Anton"/>
+            </a:endParaRPr>
+          </a:p>
+        </p:txBody>
+      </p:sp>
+      <p:sp>
+        <p:nvSpPr>
+          <p:cNvPr id="4" name="TextBox 3">
+            <a:extLst>
+              <a:ext uri="{FF2B5EF4-FFF2-40B4-BE49-F238E27FC236}">
+                <a16:creationId xmlns:a16="http://schemas.microsoft.com/office/drawing/2014/main" id="{32A1448D-8968-AB9C-0965-EAE0EA4C9555}"/>
+              </a:ext>
+            </a:extLst>
+          </p:cNvPr>
+          <p:cNvSpPr txBox="1"/>
+          <p:nvPr/>
+        </p:nvSpPr>
+        <p:spPr>
+          <a:xfrm>
+            <a:off x="281334" y="1101336"/>
+            <a:ext cx="8459254" cy="1384995"/>
+          </a:xfrm>
+          <a:prstGeom prst="rect">
+            <a:avLst/>
+          </a:prstGeom>
+          <a:noFill/>
+        </p:spPr>
+        <p:txBody>
+          <a:bodyPr wrap="square">
+            <a:spAutoFit/>
+          </a:bodyPr>
+          <a:lstStyle/>
+          <a:p>
+            <a:r>
+              <a:rPr lang="en-US" b="0" dirty="0">
+                <a:solidFill>
+                  <a:srgbClr val="6A9955"/>
+                </a:solidFill>
+                <a:effectLst/>
+                <a:latin typeface="Consolas" panose="020B0609020204030204" pitchFamily="49" charset="0"/>
+              </a:rPr>
+              <a:t>#Q:Write a python that takes the LHHS staff list and rewrite the file in a new format contains the following columns: First Name, Last Name, Email and includes ONLY TEACHERS – No VPs, principal </a:t>
+            </a:r>
+            <a:r>
+              <a:rPr lang="en-US" b="0" dirty="0" err="1">
+                <a:solidFill>
+                  <a:srgbClr val="6A9955"/>
+                </a:solidFill>
+                <a:effectLst/>
+                <a:latin typeface="Consolas" panose="020B0609020204030204" pitchFamily="49" charset="0"/>
+              </a:rPr>
+              <a:t>etc</a:t>
+            </a:r>
+            <a:r>
+              <a:rPr lang="en-US" b="0" dirty="0">
+                <a:solidFill>
+                  <a:srgbClr val="6A9955"/>
+                </a:solidFill>
+                <a:effectLst/>
+                <a:latin typeface="Consolas" panose="020B0609020204030204" pitchFamily="49" charset="0"/>
+              </a:rPr>
+              <a:t>…</a:t>
+            </a:r>
+          </a:p>
+          <a:p>
+            <a:endParaRPr lang="en-US" dirty="0">
+              <a:solidFill>
+                <a:srgbClr val="6A9955"/>
+              </a:solidFill>
+              <a:latin typeface="Consolas" panose="020B0609020204030204" pitchFamily="49" charset="0"/>
+            </a:endParaRPr>
+          </a:p>
+          <a:p>
+            <a:r>
+              <a:rPr lang="en-US" dirty="0">
+                <a:solidFill>
+                  <a:srgbClr val="6A9955"/>
+                </a:solidFill>
+                <a:latin typeface="Consolas" panose="020B0609020204030204" pitchFamily="49" charset="0"/>
+              </a:rPr>
+              <a:t>HINT: Use </a:t>
+            </a:r>
+            <a:r>
+              <a:rPr lang="en-US" dirty="0" err="1">
+                <a:solidFill>
+                  <a:srgbClr val="6A9955"/>
+                </a:solidFill>
+                <a:latin typeface="Consolas" panose="020B0609020204030204" pitchFamily="49" charset="0"/>
+              </a:rPr>
+              <a:t>DictReader</a:t>
+            </a:r>
+            <a:r>
+              <a:rPr lang="en-US" dirty="0">
+                <a:solidFill>
+                  <a:srgbClr val="6A9955"/>
+                </a:solidFill>
+                <a:latin typeface="Consolas" panose="020B0609020204030204" pitchFamily="49" charset="0"/>
+              </a:rPr>
+              <a:t> and </a:t>
+            </a:r>
+            <a:r>
+              <a:rPr lang="en-US" dirty="0" err="1">
+                <a:solidFill>
+                  <a:srgbClr val="6A9955"/>
+                </a:solidFill>
+                <a:latin typeface="Consolas" panose="020B0609020204030204" pitchFamily="49" charset="0"/>
+              </a:rPr>
+              <a:t>DictWriter</a:t>
+            </a:r>
+            <a:r>
+              <a:rPr lang="en-US" dirty="0">
+                <a:solidFill>
+                  <a:srgbClr val="6A9955"/>
+                </a:solidFill>
+                <a:latin typeface="Consolas" panose="020B0609020204030204" pitchFamily="49" charset="0"/>
+              </a:rPr>
+              <a:t> methods</a:t>
+            </a:r>
+          </a:p>
+          <a:p>
+            <a:r>
+              <a:rPr lang="en-US" b="0" dirty="0">
+                <a:solidFill>
+                  <a:srgbClr val="6A9955"/>
+                </a:solidFill>
+                <a:effectLst/>
+                <a:latin typeface="Consolas" panose="020B0609020204030204" pitchFamily="49" charset="0"/>
+              </a:rPr>
+              <a:t>HINT: Use an if…else statement determine if Position contains the string “teacher”  </a:t>
+            </a:r>
+          </a:p>
+        </p:txBody>
+      </p:sp>
+    </p:spTree>
+    <p:extLst>
+      <p:ext uri="{BB962C8B-B14F-4D97-AF65-F5344CB8AC3E}">
+        <p14:creationId xmlns:p14="http://schemas.microsoft.com/office/powerpoint/2010/main" val="3025138811"/>
+      </p:ext>
+    </p:extLst>
+  </p:cSld>
+  <p:clrMapOvr>
+    <a:masterClrMapping/>
+  </p:clrMapOvr>
+</p:sld>
+</file>
+
 <file path=ppt/slides/slide2.xml><?xml version="1.0" encoding="utf-8"?>
 <p:sld xmlns:a="http://schemas.openxmlformats.org/drawingml/2006/main" xmlns:r="http://schemas.openxmlformats.org/officeDocument/2006/relationships" xmlns:p="http://schemas.openxmlformats.org/presentationml/2006/main">
   <p:cSld>

</xml_diff>

<commit_message>
corrected newline typo in csv examples and Hint typo in warmup excercises
</commit_message>
<xml_diff>
--- a/002_Course_Exercises/01_Warmup_Exercises/01_CS110_Warmup_Exercises.pptx
+++ b/002_Course_Exercises/01_Warmup_Exercises/01_CS110_Warmup_Exercises.pptx
@@ -4394,7 +4394,7 @@
         <p:spPr>
           <a:xfrm>
             <a:off x="281334" y="1101336"/>
-            <a:ext cx="8459254" cy="2246769"/>
+            <a:ext cx="8459254" cy="2031325"/>
           </a:xfrm>
           <a:prstGeom prst="rect">
             <a:avLst/>
@@ -4531,38 +4531,6 @@
               <a:effectLst/>
               <a:latin typeface="Consolas" panose="020B0609020204030204" pitchFamily="49" charset="0"/>
             </a:endParaRPr>
-          </a:p>
-          <a:p>
-            <a:r>
-              <a:rPr lang="en-US" b="0" dirty="0">
-                <a:solidFill>
-                  <a:srgbClr val="6A9955"/>
-                </a:solidFill>
-                <a:effectLst/>
-                <a:latin typeface="Consolas" panose="020B0609020204030204" pitchFamily="49" charset="0"/>
-              </a:rPr>
-              <a:t>Hint3: split(“\n”)  but the is also </a:t>
-            </a:r>
-            <a:r>
-              <a:rPr lang="en-US" b="0" dirty="0" err="1">
-                <a:solidFill>
-                  <a:srgbClr val="6A9955"/>
-                </a:solidFill>
-                <a:effectLst/>
-                <a:latin typeface="Consolas" panose="020B0609020204030204" pitchFamily="49" charset="0"/>
-              </a:rPr>
-              <a:t>rsplit</a:t>
-            </a:r>
-            <a:r>
-              <a:rPr lang="en-US" b="0" dirty="0">
-                <a:solidFill>
-                  <a:srgbClr val="6A9955"/>
-                </a:solidFill>
-                <a:effectLst/>
-                <a:latin typeface="Consolas" panose="020B0609020204030204" pitchFamily="49" charset="0"/>
-              </a:rPr>
-              <a:t>(“\n”)</a:t>
-            </a:r>
           </a:p>
         </p:txBody>
       </p:sp>

</xml_diff>

<commit_message>
Added New warmup tkinter counter excercise
</commit_message>
<xml_diff>
--- a/002_Course_Exercises/01_Warmup_Exercises/01_CS110_Warmup_Exercises.pptx
+++ b/002_Course_Exercises/01_Warmup_Exercises/01_CS110_Warmup_Exercises.pptx
@@ -5,7 +5,7 @@
     <p:sldMasterId id="2147483681" r:id="rId1"/>
   </p:sldMasterIdLst>
   <p:notesMasterIdLst>
-    <p:notesMasterId r:id="rId16"/>
+    <p:notesMasterId r:id="rId17"/>
   </p:notesMasterIdLst>
   <p:sldIdLst>
     <p:sldId id="343" r:id="rId2"/>
@@ -22,30 +22,31 @@
     <p:sldId id="344" r:id="rId13"/>
     <p:sldId id="345" r:id="rId14"/>
     <p:sldId id="346" r:id="rId15"/>
+    <p:sldId id="349" r:id="rId16"/>
   </p:sldIdLst>
   <p:sldSz cx="9144000" cy="5143500" type="screen16x9"/>
   <p:notesSz cx="6858000" cy="9144000"/>
   <p:embeddedFontLst>
     <p:embeddedFont>
       <p:font typeface="Anton" pitchFamily="2" charset="0"/>
-      <p:regular r:id="rId17"/>
+      <p:regular r:id="rId18"/>
     </p:embeddedFont>
     <p:embeddedFont>
       <p:font typeface="Catamaran" panose="020B0604020202020204" charset="0"/>
-      <p:regular r:id="rId18"/>
-      <p:bold r:id="rId19"/>
+      <p:regular r:id="rId19"/>
+      <p:bold r:id="rId20"/>
     </p:embeddedFont>
     <p:embeddedFont>
       <p:font typeface="Consolas" panose="020B0609020204030204" pitchFamily="49" charset="0"/>
-      <p:regular r:id="rId20"/>
-      <p:bold r:id="rId21"/>
-      <p:italic r:id="rId22"/>
-      <p:boldItalic r:id="rId23"/>
+      <p:regular r:id="rId21"/>
+      <p:bold r:id="rId22"/>
+      <p:italic r:id="rId23"/>
+      <p:boldItalic r:id="rId24"/>
     </p:embeddedFont>
     <p:embeddedFont>
       <p:font typeface="Nunito Light" pitchFamily="2" charset="0"/>
-      <p:regular r:id="rId24"/>
-      <p:italic r:id="rId25"/>
+      <p:regular r:id="rId25"/>
+      <p:italic r:id="rId26"/>
     </p:embeddedFont>
   </p:embeddedFontLst>
   <p:defaultTextStyle>
@@ -1098,6 +1099,133 @@
     <p:extLst>
       <p:ext uri="{BB962C8B-B14F-4D97-AF65-F5344CB8AC3E}">
         <p14:creationId xmlns:p14="http://schemas.microsoft.com/office/powerpoint/2010/main" val="1759944804"/>
+      </p:ext>
+    </p:extLst>
+  </p:cSld>
+  <p:clrMapOvr>
+    <a:masterClrMapping/>
+  </p:clrMapOvr>
+</p:notes>
+</file>
+
+<file path=ppt/notesSlides/notesSlide12.xml><?xml version="1.0" encoding="utf-8"?>
+<p:notes xmlns:a="http://schemas.openxmlformats.org/drawingml/2006/main" xmlns:r="http://schemas.openxmlformats.org/officeDocument/2006/relationships" xmlns:p="http://schemas.openxmlformats.org/presentationml/2006/main" showMasterSp="0" showMasterPhAnim="0">
+  <p:cSld>
+    <p:spTree>
+      <p:nvGrpSpPr>
+        <p:cNvPr id="1" name="Shape 873">
+          <a:extLst>
+            <a:ext uri="{FF2B5EF4-FFF2-40B4-BE49-F238E27FC236}">
+              <a16:creationId xmlns:a16="http://schemas.microsoft.com/office/drawing/2014/main" id="{208ADCB1-5531-918B-3D85-47B78F1A8E9D}"/>
+            </a:ext>
+          </a:extLst>
+        </p:cNvPr>
+        <p:cNvGrpSpPr/>
+        <p:nvPr/>
+      </p:nvGrpSpPr>
+      <p:grpSpPr>
+        <a:xfrm>
+          <a:off x="0" y="0"/>
+          <a:ext cx="0" cy="0"/>
+          <a:chOff x="0" y="0"/>
+          <a:chExt cx="0" cy="0"/>
+        </a:xfrm>
+      </p:grpSpPr>
+      <p:sp>
+        <p:nvSpPr>
+          <p:cNvPr id="874" name="Google Shape;874;g1de1b5658bb_0_38:notes">
+            <a:extLst>
+              <a:ext uri="{FF2B5EF4-FFF2-40B4-BE49-F238E27FC236}">
+                <a16:creationId xmlns:a16="http://schemas.microsoft.com/office/drawing/2014/main" id="{5C4B7706-D1EB-350B-9B5C-D9F7653AFF7A}"/>
+              </a:ext>
+            </a:extLst>
+          </p:cNvPr>
+          <p:cNvSpPr>
+            <a:spLocks noGrp="1" noRot="1" noChangeAspect="1"/>
+          </p:cNvSpPr>
+          <p:nvPr>
+            <p:ph type="sldImg" idx="2"/>
+          </p:nvPr>
+        </p:nvSpPr>
+        <p:spPr>
+          <a:xfrm>
+            <a:off x="381000" y="685800"/>
+            <a:ext cx="6096000" cy="3429000"/>
+          </a:xfrm>
+          <a:custGeom>
+            <a:avLst/>
+            <a:gdLst/>
+            <a:ahLst/>
+            <a:cxnLst/>
+            <a:rect l="l" t="t" r="r" b="b"/>
+            <a:pathLst>
+              <a:path w="120000" h="120000" extrusionOk="0">
+                <a:moveTo>
+                  <a:pt x="0" y="0"/>
+                </a:moveTo>
+                <a:lnTo>
+                  <a:pt x="120000" y="0"/>
+                </a:lnTo>
+                <a:lnTo>
+                  <a:pt x="120000" y="120000"/>
+                </a:lnTo>
+                <a:lnTo>
+                  <a:pt x="0" y="120000"/>
+                </a:lnTo>
+                <a:close/>
+              </a:path>
+            </a:pathLst>
+          </a:custGeom>
+        </p:spPr>
+      </p:sp>
+      <p:sp>
+        <p:nvSpPr>
+          <p:cNvPr id="875" name="Google Shape;875;g1de1b5658bb_0_38:notes">
+            <a:extLst>
+              <a:ext uri="{FF2B5EF4-FFF2-40B4-BE49-F238E27FC236}">
+                <a16:creationId xmlns:a16="http://schemas.microsoft.com/office/drawing/2014/main" id="{D535456E-DAA8-90C1-EB14-68B4D6718FEF}"/>
+              </a:ext>
+            </a:extLst>
+          </p:cNvPr>
+          <p:cNvSpPr txBox="1">
+            <a:spLocks noGrp="1"/>
+          </p:cNvSpPr>
+          <p:nvPr>
+            <p:ph type="body" idx="1"/>
+          </p:nvPr>
+        </p:nvSpPr>
+        <p:spPr>
+          <a:xfrm>
+            <a:off x="685800" y="4343400"/>
+            <a:ext cx="5486400" cy="4114800"/>
+          </a:xfrm>
+          <a:prstGeom prst="rect">
+            <a:avLst/>
+          </a:prstGeom>
+        </p:spPr>
+        <p:txBody>
+          <a:bodyPr spcFirstLastPara="1" wrap="square" lIns="91425" tIns="91425" rIns="91425" bIns="91425" anchor="t" anchorCtr="0">
+            <a:noAutofit/>
+          </a:bodyPr>
+          <a:lstStyle/>
+          <a:p>
+            <a:pPr marL="0" lvl="0" indent="0" algn="l" rtl="0">
+              <a:spcBef>
+                <a:spcPts val="0"/>
+              </a:spcBef>
+              <a:spcAft>
+                <a:spcPts val="0"/>
+              </a:spcAft>
+              <a:buNone/>
+            </a:pPr>
+            <a:endParaRPr dirty="0"/>
+          </a:p>
+        </p:txBody>
+      </p:sp>
+    </p:spTree>
+    <p:extLst>
+      <p:ext uri="{BB962C8B-B14F-4D97-AF65-F5344CB8AC3E}">
+        <p14:creationId xmlns:p14="http://schemas.microsoft.com/office/powerpoint/2010/main" val="481644581"/>
       </p:ext>
     </p:extLst>
   </p:cSld>
@@ -7593,6 +7721,253 @@
 </p:sld>
 </file>
 
+<file path=ppt/slides/slide15.xml><?xml version="1.0" encoding="utf-8"?>
+<p:sld xmlns:a="http://schemas.openxmlformats.org/drawingml/2006/main" xmlns:r="http://schemas.openxmlformats.org/officeDocument/2006/relationships" xmlns:p="http://schemas.openxmlformats.org/presentationml/2006/main">
+  <p:cSld>
+    <p:spTree>
+      <p:nvGrpSpPr>
+        <p:cNvPr id="1" name="Shape 876">
+          <a:extLst>
+            <a:ext uri="{FF2B5EF4-FFF2-40B4-BE49-F238E27FC236}">
+              <a16:creationId xmlns:a16="http://schemas.microsoft.com/office/drawing/2014/main" id="{59AA2DF2-86B2-E92B-1B14-DF2774F31DA9}"/>
+            </a:ext>
+          </a:extLst>
+        </p:cNvPr>
+        <p:cNvGrpSpPr/>
+        <p:nvPr/>
+      </p:nvGrpSpPr>
+      <p:grpSpPr>
+        <a:xfrm>
+          <a:off x="0" y="0"/>
+          <a:ext cx="0" cy="0"/>
+          <a:chOff x="0" y="0"/>
+          <a:chExt cx="0" cy="0"/>
+        </a:xfrm>
+      </p:grpSpPr>
+      <p:sp>
+        <p:nvSpPr>
+          <p:cNvPr id="877" name="Google Shape;877;p41">
+            <a:extLst>
+              <a:ext uri="{FF2B5EF4-FFF2-40B4-BE49-F238E27FC236}">
+                <a16:creationId xmlns:a16="http://schemas.microsoft.com/office/drawing/2014/main" id="{0BE75D26-21D0-F37D-CBE4-5E519EA261C2}"/>
+              </a:ext>
+            </a:extLst>
+          </p:cNvPr>
+          <p:cNvSpPr txBox="1">
+            <a:spLocks noGrp="1"/>
+          </p:cNvSpPr>
+          <p:nvPr>
+            <p:ph type="title"/>
+          </p:nvPr>
+        </p:nvSpPr>
+        <p:spPr>
+          <a:xfrm>
+            <a:off x="281335" y="383241"/>
+            <a:ext cx="7704000" cy="572700"/>
+          </a:xfrm>
+          <a:prstGeom prst="rect">
+            <a:avLst/>
+          </a:prstGeom>
+        </p:spPr>
+        <p:txBody>
+          <a:bodyPr spcFirstLastPara="1" wrap="square" lIns="91425" tIns="91425" rIns="91425" bIns="91425" anchor="t" anchorCtr="0">
+            <a:noAutofit/>
+          </a:bodyPr>
+          <a:lstStyle/>
+          <a:p>
+            <a:pPr marL="0" lvl="0" indent="0" rtl="0">
+              <a:spcBef>
+                <a:spcPts val="0"/>
+              </a:spcBef>
+              <a:spcAft>
+                <a:spcPts val="0"/>
+              </a:spcAft>
+              <a:buNone/>
+            </a:pPr>
+            <a:r>
+              <a:rPr lang="en-CA" sz="3200" dirty="0">
+                <a:solidFill>
+                  <a:schemeClr val="hlink"/>
+                </a:solidFill>
+                <a:uFill>
+                  <a:noFill/>
+                </a:uFill>
+                <a:latin typeface="Anton"/>
+                <a:ea typeface="Anton"/>
+                <a:cs typeface="Anton"/>
+                <a:sym typeface="Anton"/>
+              </a:rPr>
+              <a:t>#12 Coding Warm-Up: Creating A Timer With </a:t>
+            </a:r>
+            <a:r>
+              <a:rPr lang="en-CA" sz="3200" dirty="0" err="1">
+                <a:solidFill>
+                  <a:schemeClr val="hlink"/>
+                </a:solidFill>
+                <a:uFill>
+                  <a:noFill/>
+                </a:uFill>
+                <a:latin typeface="Anton"/>
+                <a:ea typeface="Anton"/>
+                <a:cs typeface="Anton"/>
+                <a:sym typeface="Anton"/>
+              </a:rPr>
+              <a:t>Tkinter</a:t>
+            </a:r>
+            <a:r>
+              <a:rPr lang="en-CA" sz="3200" dirty="0">
+                <a:solidFill>
+                  <a:schemeClr val="hlink"/>
+                </a:solidFill>
+                <a:uFill>
+                  <a:noFill/>
+                </a:uFill>
+                <a:latin typeface="Anton"/>
+                <a:ea typeface="Anton"/>
+                <a:cs typeface="Anton"/>
+                <a:sym typeface="Anton"/>
+              </a:rPr>
+              <a:t> &amp; Datetime</a:t>
+            </a:r>
+            <a:endParaRPr lang="en-CA" sz="3200" dirty="0">
+              <a:solidFill>
+                <a:schemeClr val="dk1"/>
+              </a:solidFill>
+              <a:latin typeface="Anton"/>
+              <a:ea typeface="Anton"/>
+              <a:cs typeface="Anton"/>
+              <a:sym typeface="Anton"/>
+            </a:endParaRPr>
+          </a:p>
+        </p:txBody>
+      </p:sp>
+      <p:sp>
+        <p:nvSpPr>
+          <p:cNvPr id="4" name="TextBox 3">
+            <a:extLst>
+              <a:ext uri="{FF2B5EF4-FFF2-40B4-BE49-F238E27FC236}">
+                <a16:creationId xmlns:a16="http://schemas.microsoft.com/office/drawing/2014/main" id="{32A1448D-8968-AB9C-0965-EAE0EA4C9555}"/>
+              </a:ext>
+            </a:extLst>
+          </p:cNvPr>
+          <p:cNvSpPr txBox="1"/>
+          <p:nvPr/>
+        </p:nvSpPr>
+        <p:spPr>
+          <a:xfrm>
+            <a:off x="281335" y="1768601"/>
+            <a:ext cx="8459254" cy="1600438"/>
+          </a:xfrm>
+          <a:prstGeom prst="rect">
+            <a:avLst/>
+          </a:prstGeom>
+          <a:noFill/>
+        </p:spPr>
+        <p:txBody>
+          <a:bodyPr wrap="square">
+            <a:spAutoFit/>
+          </a:bodyPr>
+          <a:lstStyle/>
+          <a:p>
+            <a:r>
+              <a:rPr lang="en-US" b="0" dirty="0">
+                <a:solidFill>
+                  <a:srgbClr val="6A9955"/>
+                </a:solidFill>
+                <a:effectLst/>
+                <a:latin typeface="Consolas" panose="020B0609020204030204" pitchFamily="49" charset="0"/>
+              </a:rPr>
+              <a:t>#Q:Looking at the course code examples (UNIT 5 01_Python_Modules), </a:t>
+            </a:r>
+            <a:r>
+              <a:rPr lang="en-US" dirty="0">
+                <a:solidFill>
+                  <a:srgbClr val="6A9955"/>
+                </a:solidFill>
+                <a:latin typeface="Consolas" panose="020B0609020204030204" pitchFamily="49" charset="0"/>
+              </a:rPr>
+              <a:t>Write a python program that uses the datetime module to count the time remaining a certain day (End of the School Year Maybe)</a:t>
+            </a:r>
+          </a:p>
+          <a:p>
+            <a:endParaRPr lang="en-US" b="0" dirty="0">
+              <a:solidFill>
+                <a:srgbClr val="6A9955"/>
+              </a:solidFill>
+              <a:effectLst/>
+              <a:latin typeface="Consolas" panose="020B0609020204030204" pitchFamily="49" charset="0"/>
+            </a:endParaRPr>
+          </a:p>
+          <a:p>
+            <a:r>
+              <a:rPr lang="en-US" b="0" dirty="0">
+                <a:solidFill>
+                  <a:srgbClr val="6A9955"/>
+                </a:solidFill>
+                <a:effectLst/>
+                <a:latin typeface="Consolas" panose="020B0609020204030204" pitchFamily="49" charset="0"/>
+              </a:rPr>
+              <a:t>Next, use </a:t>
+            </a:r>
+            <a:r>
+              <a:rPr lang="en-US" b="0" dirty="0" err="1">
+                <a:solidFill>
+                  <a:srgbClr val="6A9955"/>
+                </a:solidFill>
+                <a:effectLst/>
+                <a:latin typeface="Consolas" panose="020B0609020204030204" pitchFamily="49" charset="0"/>
+              </a:rPr>
+              <a:t>tkin</a:t>
+            </a:r>
+            <a:r>
+              <a:rPr lang="en-US" dirty="0" err="1">
+                <a:solidFill>
+                  <a:srgbClr val="6A9955"/>
+                </a:solidFill>
+                <a:latin typeface="Consolas" panose="020B0609020204030204" pitchFamily="49" charset="0"/>
+              </a:rPr>
+              <a:t>ter</a:t>
+            </a:r>
+            <a:r>
+              <a:rPr lang="en-US" dirty="0">
+                <a:solidFill>
+                  <a:srgbClr val="6A9955"/>
+                </a:solidFill>
+                <a:latin typeface="Consolas" panose="020B0609020204030204" pitchFamily="49" charset="0"/>
+              </a:rPr>
+              <a:t> to create a GUI that prints the counter to the screen and updates every 1 second (See the last Example 6 in the course code notes)</a:t>
+            </a:r>
+            <a:endParaRPr lang="en-US" b="0" dirty="0">
+              <a:solidFill>
+                <a:srgbClr val="6A9955"/>
+              </a:solidFill>
+              <a:effectLst/>
+              <a:latin typeface="Consolas" panose="020B0609020204030204" pitchFamily="49" charset="0"/>
+            </a:endParaRPr>
+          </a:p>
+          <a:p>
+            <a:endParaRPr lang="en-US" dirty="0">
+              <a:solidFill>
+                <a:srgbClr val="6A9955"/>
+              </a:solidFill>
+              <a:latin typeface="Consolas" panose="020B0609020204030204" pitchFamily="49" charset="0"/>
+            </a:endParaRPr>
+          </a:p>
+        </p:txBody>
+      </p:sp>
+    </p:spTree>
+    <p:extLst>
+      <p:ext uri="{BB962C8B-B14F-4D97-AF65-F5344CB8AC3E}">
+        <p14:creationId xmlns:p14="http://schemas.microsoft.com/office/powerpoint/2010/main" val="3809448887"/>
+      </p:ext>
+    </p:extLst>
+  </p:cSld>
+  <p:clrMapOvr>
+    <a:masterClrMapping/>
+  </p:clrMapOvr>
+</p:sld>
+</file>
+
 <file path=ppt/slides/slide2.xml><?xml version="1.0" encoding="utf-8"?>
 <p:sld xmlns:a="http://schemas.openxmlformats.org/drawingml/2006/main" xmlns:r="http://schemas.openxmlformats.org/officeDocument/2006/relationships" xmlns:p="http://schemas.openxmlformats.org/presentationml/2006/main">
   <p:cSld>

</xml_diff>